<commit_message>
almost done, just need plots
</commit_message>
<xml_diff>
--- a/BIOE5100_finalproj_spr25.pptx
+++ b/BIOE5100_finalproj_spr25.pptx
@@ -132,7 +132,7 @@
   <pc:docChgLst>
     <pc:chgData name="Suarez, Skylar" userId="07529912-540e-4881-b69e-f936e48f9be2" providerId="ADAL" clId="{92CB820A-12D0-42B2-9B40-3641CD54FA7E}"/>
     <pc:docChg chg="undo custSel addSld modSld">
-      <pc:chgData name="Suarez, Skylar" userId="07529912-540e-4881-b69e-f936e48f9be2" providerId="ADAL" clId="{92CB820A-12D0-42B2-9B40-3641CD54FA7E}" dt="2025-05-02T17:39:39.882" v="1141" actId="962"/>
+      <pc:chgData name="Suarez, Skylar" userId="07529912-540e-4881-b69e-f936e48f9be2" providerId="ADAL" clId="{92CB820A-12D0-42B2-9B40-3641CD54FA7E}" dt="2025-05-02T22:49:06.468" v="1157" actId="1076"/>
       <pc:docMkLst>
         <pc:docMk/>
       </pc:docMkLst>
@@ -396,8 +396,8 @@
           </ac:picMkLst>
         </pc:picChg>
       </pc:sldChg>
-      <pc:sldChg chg="addSp delSp modSp new mod setBg">
-        <pc:chgData name="Suarez, Skylar" userId="07529912-540e-4881-b69e-f936e48f9be2" providerId="ADAL" clId="{92CB820A-12D0-42B2-9B40-3641CD54FA7E}" dt="2025-05-02T17:39:39.882" v="1141" actId="962"/>
+      <pc:sldChg chg="addSp delSp modSp new mod setBg modNotesTx">
+        <pc:chgData name="Suarez, Skylar" userId="07529912-540e-4881-b69e-f936e48f9be2" providerId="ADAL" clId="{92CB820A-12D0-42B2-9B40-3641CD54FA7E}" dt="2025-05-02T22:49:06.468" v="1157" actId="1076"/>
         <pc:sldMkLst>
           <pc:docMk/>
           <pc:sldMk cId="1306262326" sldId="260"/>
@@ -435,11 +435,19 @@
           </ac:spMkLst>
         </pc:spChg>
         <pc:picChg chg="add mod">
-          <ac:chgData name="Suarez, Skylar" userId="07529912-540e-4881-b69e-f936e48f9be2" providerId="ADAL" clId="{92CB820A-12D0-42B2-9B40-3641CD54FA7E}" dt="2025-05-02T17:39:39.882" v="1141" actId="962"/>
+          <ac:chgData name="Suarez, Skylar" userId="07529912-540e-4881-b69e-f936e48f9be2" providerId="ADAL" clId="{92CB820A-12D0-42B2-9B40-3641CD54FA7E}" dt="2025-05-02T22:49:06.468" v="1157" actId="1076"/>
           <ac:picMkLst>
             <pc:docMk/>
             <pc:sldMk cId="1306262326" sldId="260"/>
             <ac:picMk id="3" creationId="{B2FB8105-B6C0-A378-B4BF-D11B8C83BE4E}"/>
+          </ac:picMkLst>
+        </pc:picChg>
+        <pc:picChg chg="add mod">
+          <ac:chgData name="Suarez, Skylar" userId="07529912-540e-4881-b69e-f936e48f9be2" providerId="ADAL" clId="{92CB820A-12D0-42B2-9B40-3641CD54FA7E}" dt="2025-05-02T22:48:57.107" v="1155" actId="1076"/>
+          <ac:picMkLst>
+            <pc:docMk/>
+            <pc:sldMk cId="1306262326" sldId="260"/>
+            <ac:picMk id="4" creationId="{23DB23D2-E9C4-2A5E-9DC7-F076C380E3E8}"/>
           </ac:picMkLst>
         </pc:picChg>
       </pc:sldChg>
@@ -1129,6 +1137,90 @@
     <p:extLst>
       <p:ext uri="{BB962C8B-B14F-4D97-AF65-F5344CB8AC3E}">
         <p14:creationId xmlns:p14="http://schemas.microsoft.com/office/powerpoint/2010/main" val="529184063"/>
+      </p:ext>
+    </p:extLst>
+  </p:cSld>
+  <p:clrMapOvr>
+    <a:masterClrMapping/>
+  </p:clrMapOvr>
+</p:notes>
+</file>
+
+<file path=ppt/notesSlides/notesSlide4.xml><?xml version="1.0" encoding="utf-8"?>
+<p:notes xmlns:a="http://schemas.openxmlformats.org/drawingml/2006/main" xmlns:r="http://schemas.openxmlformats.org/officeDocument/2006/relationships" xmlns:p="http://schemas.openxmlformats.org/presentationml/2006/main">
+  <p:cSld>
+    <p:spTree>
+      <p:nvGrpSpPr>
+        <p:cNvPr id="1" name=""/>
+        <p:cNvGrpSpPr/>
+        <p:nvPr/>
+      </p:nvGrpSpPr>
+      <p:grpSpPr>
+        <a:xfrm>
+          <a:off x="0" y="0"/>
+          <a:ext cx="0" cy="0"/>
+          <a:chOff x="0" y="0"/>
+          <a:chExt cx="0" cy="0"/>
+        </a:xfrm>
+      </p:grpSpPr>
+      <p:sp>
+        <p:nvSpPr>
+          <p:cNvPr id="2" name="Slide Image Placeholder 1"/>
+          <p:cNvSpPr>
+            <a:spLocks noGrp="1" noRot="1" noChangeAspect="1"/>
+          </p:cNvSpPr>
+          <p:nvPr>
+            <p:ph type="sldImg"/>
+          </p:nvPr>
+        </p:nvSpPr>
+        <p:spPr/>
+      </p:sp>
+      <p:sp>
+        <p:nvSpPr>
+          <p:cNvPr id="3" name="Notes Placeholder 2"/>
+          <p:cNvSpPr>
+            <a:spLocks noGrp="1"/>
+          </p:cNvSpPr>
+          <p:nvPr>
+            <p:ph type="body" idx="1"/>
+          </p:nvPr>
+        </p:nvSpPr>
+        <p:spPr/>
+        <p:txBody>
+          <a:bodyPr/>
+          <a:lstStyle/>
+          <a:p>
+            <a:endParaRPr lang="en-US" dirty="0"/>
+          </a:p>
+        </p:txBody>
+      </p:sp>
+      <p:sp>
+        <p:nvSpPr>
+          <p:cNvPr id="4" name="Slide Number Placeholder 3"/>
+          <p:cNvSpPr>
+            <a:spLocks noGrp="1"/>
+          </p:cNvSpPr>
+          <p:nvPr>
+            <p:ph type="sldNum" sz="quarter" idx="5"/>
+          </p:nvPr>
+        </p:nvSpPr>
+        <p:spPr/>
+        <p:txBody>
+          <a:bodyPr/>
+          <a:lstStyle/>
+          <a:p>
+            <a:fld id="{B78680F4-ED72-4C0B-964B-2ADB778FE041}" type="slidenum">
+              <a:rPr lang="en-US" smtClean="0"/>
+              <a:t>5</a:t>
+            </a:fld>
+            <a:endParaRPr lang="en-US"/>
+          </a:p>
+        </p:txBody>
+      </p:sp>
+    </p:spTree>
+    <p:extLst>
+      <p:ext uri="{BB962C8B-B14F-4D97-AF65-F5344CB8AC3E}">
+        <p14:creationId xmlns:p14="http://schemas.microsoft.com/office/powerpoint/2010/main" val="2027871295"/>
       </p:ext>
     </p:extLst>
   </p:cSld>
@@ -7117,15 +7209,45 @@
           <p:nvPr/>
         </p:nvPicPr>
         <p:blipFill>
-          <a:blip r:embed="rId2"/>
+          <a:blip r:embed="rId3"/>
           <a:stretch>
             <a:fillRect/>
           </a:stretch>
         </p:blipFill>
         <p:spPr>
           <a:xfrm>
-            <a:off x="0" y="228841"/>
-            <a:ext cx="12192000" cy="6400317"/>
+            <a:off x="1226819" y="222310"/>
+            <a:ext cx="9424852" cy="4947674"/>
+          </a:xfrm>
+          <a:prstGeom prst="rect">
+            <a:avLst/>
+          </a:prstGeom>
+        </p:spPr>
+      </p:pic>
+      <p:pic>
+        <p:nvPicPr>
+          <p:cNvPr id="4" name="Picture 3">
+            <a:extLst>
+              <a:ext uri="{FF2B5EF4-FFF2-40B4-BE49-F238E27FC236}">
+                <a16:creationId xmlns:a16="http://schemas.microsoft.com/office/drawing/2014/main" id="{23DB23D2-E9C4-2A5E-9DC7-F076C380E3E8}"/>
+              </a:ext>
+            </a:extLst>
+          </p:cNvPr>
+          <p:cNvPicPr>
+            <a:picLocks noChangeAspect="1"/>
+          </p:cNvPicPr>
+          <p:nvPr/>
+        </p:nvPicPr>
+        <p:blipFill>
+          <a:blip r:embed="rId4"/>
+          <a:stretch>
+            <a:fillRect/>
+          </a:stretch>
+        </p:blipFill>
+        <p:spPr>
+          <a:xfrm>
+            <a:off x="448262" y="5221221"/>
+            <a:ext cx="10981966" cy="1636779"/>
           </a:xfrm>
           <a:prstGeom prst="rect">
             <a:avLst/>

</xml_diff>